<commit_message>
fix basic computer skill chapter 6
</commit_message>
<xml_diff>
--- a/Android10/1_Pixel3_Image.pptx
+++ b/Android10/1_Pixel3_Image.pptx
@@ -161,7 +161,7 @@
 <file path=ppt/revisionInfo.xml><?xml version="1.0" encoding="utf-8"?>
 <p1510:revInfo xmlns:a="http://schemas.openxmlformats.org/drawingml/2006/main" xmlns:r="http://schemas.openxmlformats.org/officeDocument/2006/relationships" xmlns:p1510="http://schemas.microsoft.com/office/powerpoint/2015/10/main">
   <p1510:revLst>
-    <p1510:client id="{3EF660C2-5E00-497A-8141-0937EA7FF5A5}" v="44" dt="2025-09-09T13:56:53.782"/>
+    <p1510:client id="{D4D54F02-3238-43DF-B735-EC8D236BDA0E}" v="3" dt="2025-09-11T15:31:35.827"/>
   </p1510:revLst>
 </p1510:revInfo>
 </file>
@@ -1803,7 +1803,7 @@
   <pc:docChgLst>
     <pc:chgData name="Weifeng Xu" userId="e7aed605-a3dd-4d5a-a692-a87037af107b" providerId="ADAL" clId="{F99F8FFF-BA20-43EA-924B-4DF5D2A785F3}"/>
     <pc:docChg chg="undo custSel addSld modSld">
-      <pc:chgData name="Weifeng Xu" userId="e7aed605-a3dd-4d5a-a692-a87037af107b" providerId="ADAL" clId="{F99F8FFF-BA20-43EA-924B-4DF5D2A785F3}" dt="2025-09-09T14:00:08.236" v="376" actId="207"/>
+      <pc:chgData name="Weifeng Xu" userId="e7aed605-a3dd-4d5a-a692-a87037af107b" providerId="ADAL" clId="{F99F8FFF-BA20-43EA-924B-4DF5D2A785F3}" dt="2025-09-11T15:31:35.827" v="432" actId="478"/>
       <pc:docMkLst>
         <pc:docMk/>
       </pc:docMkLst>
@@ -1822,28 +1822,58 @@
           </ac:spMkLst>
         </pc:spChg>
       </pc:sldChg>
+      <pc:sldChg chg="delSp modSp mod">
+        <pc:chgData name="Weifeng Xu" userId="e7aed605-a3dd-4d5a-a692-a87037af107b" providerId="ADAL" clId="{F99F8FFF-BA20-43EA-924B-4DF5D2A785F3}" dt="2025-09-11T15:31:35.827" v="432" actId="478"/>
+        <pc:sldMkLst>
+          <pc:docMk/>
+          <pc:sldMk cId="2786836983" sldId="331"/>
+        </pc:sldMkLst>
+        <pc:spChg chg="del">
+          <ac:chgData name="Weifeng Xu" userId="e7aed605-a3dd-4d5a-a692-a87037af107b" providerId="ADAL" clId="{F99F8FFF-BA20-43EA-924B-4DF5D2A785F3}" dt="2025-09-11T15:31:35.827" v="432" actId="478"/>
+          <ac:spMkLst>
+            <pc:docMk/>
+            <pc:sldMk cId="2786836983" sldId="331"/>
+            <ac:spMk id="5" creationId="{238B2818-0C2A-4945-8FA7-025F23B99D45}"/>
+          </ac:spMkLst>
+        </pc:spChg>
+        <pc:spChg chg="mod">
+          <ac:chgData name="Weifeng Xu" userId="e7aed605-a3dd-4d5a-a692-a87037af107b" providerId="ADAL" clId="{F99F8FFF-BA20-43EA-924B-4DF5D2A785F3}" dt="2025-09-11T15:30:02.418" v="429" actId="6549"/>
+          <ac:spMkLst>
+            <pc:docMk/>
+            <pc:sldMk cId="2786836983" sldId="331"/>
+            <ac:spMk id="7" creationId="{D2EC9C14-40A0-47ED-866E-3120E1FFB527}"/>
+          </ac:spMkLst>
+        </pc:spChg>
+        <pc:spChg chg="del mod">
+          <ac:chgData name="Weifeng Xu" userId="e7aed605-a3dd-4d5a-a692-a87037af107b" providerId="ADAL" clId="{F99F8FFF-BA20-43EA-924B-4DF5D2A785F3}" dt="2025-09-11T15:30:11.511" v="431" actId="478"/>
+          <ac:spMkLst>
+            <pc:docMk/>
+            <pc:sldMk cId="2786836983" sldId="331"/>
+            <ac:spMk id="9" creationId="{0FAC32FE-7A05-44A4-BE9F-03BCE7E7029A}"/>
+          </ac:spMkLst>
+        </pc:spChg>
+      </pc:sldChg>
+      <pc:sldChg chg="modSp mod">
+        <pc:chgData name="Weifeng Xu" userId="e7aed605-a3dd-4d5a-a692-a87037af107b" providerId="ADAL" clId="{F99F8FFF-BA20-43EA-924B-4DF5D2A785F3}" dt="2025-09-11T14:52:21.126" v="406" actId="6549"/>
+        <pc:sldMkLst>
+          <pc:docMk/>
+          <pc:sldMk cId="1881697046" sldId="351"/>
+        </pc:sldMkLst>
+        <pc:spChg chg="mod">
+          <ac:chgData name="Weifeng Xu" userId="e7aed605-a3dd-4d5a-a692-a87037af107b" providerId="ADAL" clId="{F99F8FFF-BA20-43EA-924B-4DF5D2A785F3}" dt="2025-09-11T14:52:21.126" v="406" actId="6549"/>
+          <ac:spMkLst>
+            <pc:docMk/>
+            <pc:sldMk cId="1881697046" sldId="351"/>
+            <ac:spMk id="3" creationId="{E6CA5CEB-EB55-5C0D-4669-76EF3BEA4513}"/>
+          </ac:spMkLst>
+        </pc:spChg>
+      </pc:sldChg>
       <pc:sldChg chg="addSp delSp modSp new mod modClrScheme chgLayout">
         <pc:chgData name="Weifeng Xu" userId="e7aed605-a3dd-4d5a-a692-a87037af107b" providerId="ADAL" clId="{F99F8FFF-BA20-43EA-924B-4DF5D2A785F3}" dt="2025-09-09T13:46:05.196" v="254" actId="20577"/>
         <pc:sldMkLst>
           <pc:docMk/>
           <pc:sldMk cId="615912425" sldId="353"/>
         </pc:sldMkLst>
-        <pc:spChg chg="del mod ord">
-          <ac:chgData name="Weifeng Xu" userId="e7aed605-a3dd-4d5a-a692-a87037af107b" providerId="ADAL" clId="{F99F8FFF-BA20-43EA-924B-4DF5D2A785F3}" dt="2025-09-09T13:04:38.386" v="1" actId="700"/>
-          <ac:spMkLst>
-            <pc:docMk/>
-            <pc:sldMk cId="615912425" sldId="353"/>
-            <ac:spMk id="2" creationId="{3FFF1879-242E-E31B-C5AF-EE3E7E606F42}"/>
-          </ac:spMkLst>
-        </pc:spChg>
-        <pc:spChg chg="del">
-          <ac:chgData name="Weifeng Xu" userId="e7aed605-a3dd-4d5a-a692-a87037af107b" providerId="ADAL" clId="{F99F8FFF-BA20-43EA-924B-4DF5D2A785F3}" dt="2025-09-09T13:04:38.386" v="1" actId="700"/>
-          <ac:spMkLst>
-            <pc:docMk/>
-            <pc:sldMk cId="615912425" sldId="353"/>
-            <ac:spMk id="3" creationId="{1AB5C137-8978-D528-03DB-68B723FA5E1A}"/>
-          </ac:spMkLst>
-        </pc:spChg>
         <pc:spChg chg="add mod ord">
           <ac:chgData name="Weifeng Xu" userId="e7aed605-a3dd-4d5a-a692-a87037af107b" providerId="ADAL" clId="{F99F8FFF-BA20-43EA-924B-4DF5D2A785F3}" dt="2025-09-09T13:46:05.196" v="254" actId="20577"/>
           <ac:spMkLst>
@@ -1852,30 +1882,6 @@
             <ac:spMk id="4" creationId="{05463EA0-C3B6-28F2-52CC-90BEC6531325}"/>
           </ac:spMkLst>
         </pc:spChg>
-        <pc:spChg chg="add">
-          <ac:chgData name="Weifeng Xu" userId="e7aed605-a3dd-4d5a-a692-a87037af107b" providerId="ADAL" clId="{F99F8FFF-BA20-43EA-924B-4DF5D2A785F3}" dt="2025-09-09T13:04:54.813" v="2"/>
-          <ac:spMkLst>
-            <pc:docMk/>
-            <pc:sldMk cId="615912425" sldId="353"/>
-            <ac:spMk id="5" creationId="{93D16AB9-70C9-C268-CB80-5F0D796A2AF4}"/>
-          </ac:spMkLst>
-        </pc:spChg>
-        <pc:spChg chg="add del mod ord">
-          <ac:chgData name="Weifeng Xu" userId="e7aed605-a3dd-4d5a-a692-a87037af107b" providerId="ADAL" clId="{F99F8FFF-BA20-43EA-924B-4DF5D2A785F3}" dt="2025-09-09T13:17:45.773" v="99" actId="700"/>
-          <ac:spMkLst>
-            <pc:docMk/>
-            <pc:sldMk cId="615912425" sldId="353"/>
-            <ac:spMk id="8" creationId="{062ABC41-AE64-45CC-62EB-0F647C0777C4}"/>
-          </ac:spMkLst>
-        </pc:spChg>
-        <pc:graphicFrameChg chg="add mod">
-          <ac:chgData name="Weifeng Xu" userId="e7aed605-a3dd-4d5a-a692-a87037af107b" providerId="ADAL" clId="{F99F8FFF-BA20-43EA-924B-4DF5D2A785F3}" dt="2025-09-09T13:09:21.122" v="9"/>
-          <ac:graphicFrameMkLst>
-            <pc:docMk/>
-            <pc:sldMk cId="615912425" sldId="353"/>
-            <ac:graphicFrameMk id="7" creationId="{BC2C53D0-5497-FB46-8A25-BA00540C9535}"/>
-          </ac:graphicFrameMkLst>
-        </pc:graphicFrameChg>
         <pc:picChg chg="add mod">
           <ac:chgData name="Weifeng Xu" userId="e7aed605-a3dd-4d5a-a692-a87037af107b" providerId="ADAL" clId="{F99F8FFF-BA20-43EA-924B-4DF5D2A785F3}" dt="2025-09-09T13:18:19.069" v="106" actId="1076"/>
           <ac:picMkLst>
@@ -1899,14 +1905,6 @@
           <pc:docMk/>
           <pc:sldMk cId="3130248869" sldId="354"/>
         </pc:sldMkLst>
-        <pc:spChg chg="del">
-          <ac:chgData name="Weifeng Xu" userId="e7aed605-a3dd-4d5a-a692-a87037af107b" providerId="ADAL" clId="{F99F8FFF-BA20-43EA-924B-4DF5D2A785F3}" dt="2025-09-09T13:09:38.670" v="14" actId="700"/>
-          <ac:spMkLst>
-            <pc:docMk/>
-            <pc:sldMk cId="3130248869" sldId="354"/>
-            <ac:spMk id="2" creationId="{93241FF2-66AD-6546-C61D-19F345001539}"/>
-          </ac:spMkLst>
-        </pc:spChg>
         <pc:graphicFrameChg chg="add mod modGraphic">
           <ac:chgData name="Weifeng Xu" userId="e7aed605-a3dd-4d5a-a692-a87037af107b" providerId="ADAL" clId="{F99F8FFF-BA20-43EA-924B-4DF5D2A785F3}" dt="2025-09-09T13:11:57.408" v="38" actId="1076"/>
           <ac:graphicFrameMkLst>
@@ -1976,14 +1974,6 @@
             <ac:spMk id="3" creationId="{408A2939-842B-8D7D-A54E-6E67C7AA8277}"/>
           </ac:spMkLst>
         </pc:spChg>
-        <pc:spChg chg="add mod">
-          <ac:chgData name="Weifeng Xu" userId="e7aed605-a3dd-4d5a-a692-a87037af107b" providerId="ADAL" clId="{F99F8FFF-BA20-43EA-924B-4DF5D2A785F3}" dt="2025-09-09T13:29:39.473" v="138"/>
-          <ac:spMkLst>
-            <pc:docMk/>
-            <pc:sldMk cId="3325037933" sldId="357"/>
-            <ac:spMk id="4" creationId="{C5F08BC2-E704-C5D2-F7CA-D7D94C1EF074}"/>
-          </ac:spMkLst>
-        </pc:spChg>
       </pc:sldChg>
       <pc:sldChg chg="modSp new mod">
         <pc:chgData name="Weifeng Xu" userId="e7aed605-a3dd-4d5a-a692-a87037af107b" providerId="ADAL" clId="{F99F8FFF-BA20-43EA-924B-4DF5D2A785F3}" dt="2025-09-09T13:35:52.487" v="223" actId="207"/>
@@ -2037,22 +2027,6 @@
           <pc:docMk/>
           <pc:sldMk cId="1825281144" sldId="360"/>
         </pc:sldMkLst>
-        <pc:spChg chg="del">
-          <ac:chgData name="Weifeng Xu" userId="e7aed605-a3dd-4d5a-a692-a87037af107b" providerId="ADAL" clId="{F99F8FFF-BA20-43EA-924B-4DF5D2A785F3}" dt="2025-09-09T13:39:15.096" v="238" actId="700"/>
-          <ac:spMkLst>
-            <pc:docMk/>
-            <pc:sldMk cId="1825281144" sldId="360"/>
-            <ac:spMk id="2" creationId="{8877B3D3-C15D-A9E6-0AA4-5A42E4028D45}"/>
-          </ac:spMkLst>
-        </pc:spChg>
-        <pc:spChg chg="del">
-          <ac:chgData name="Weifeng Xu" userId="e7aed605-a3dd-4d5a-a692-a87037af107b" providerId="ADAL" clId="{F99F8FFF-BA20-43EA-924B-4DF5D2A785F3}" dt="2025-09-09T13:39:15.096" v="238" actId="700"/>
-          <ac:spMkLst>
-            <pc:docMk/>
-            <pc:sldMk cId="1825281144" sldId="360"/>
-            <ac:spMk id="3" creationId="{020D826F-7C89-1ADA-A73D-55FF60836B66}"/>
-          </ac:spMkLst>
-        </pc:spChg>
         <pc:spChg chg="add mod ord">
           <ac:chgData name="Weifeng Xu" userId="e7aed605-a3dd-4d5a-a692-a87037af107b" providerId="ADAL" clId="{F99F8FFF-BA20-43EA-924B-4DF5D2A785F3}" dt="2025-09-09T13:39:44.355" v="243"/>
           <ac:spMkLst>
@@ -2076,14 +2050,6 @@
           <pc:docMk/>
           <pc:sldMk cId="139985094" sldId="361"/>
         </pc:sldMkLst>
-        <pc:spChg chg="del mod ord">
-          <ac:chgData name="Weifeng Xu" userId="e7aed605-a3dd-4d5a-a692-a87037af107b" providerId="ADAL" clId="{F99F8FFF-BA20-43EA-924B-4DF5D2A785F3}" dt="2025-09-09T13:46:23.117" v="256" actId="700"/>
-          <ac:spMkLst>
-            <pc:docMk/>
-            <pc:sldMk cId="139985094" sldId="361"/>
-            <ac:spMk id="2" creationId="{403EB521-3B10-560F-E897-0E04201F2F7F}"/>
-          </ac:spMkLst>
-        </pc:spChg>
         <pc:spChg chg="add mod ord">
           <ac:chgData name="Weifeng Xu" userId="e7aed605-a3dd-4d5a-a692-a87037af107b" providerId="ADAL" clId="{F99F8FFF-BA20-43EA-924B-4DF5D2A785F3}" dt="2025-09-09T13:46:28.779" v="260" actId="20577"/>
           <ac:spMkLst>
@@ -2107,14 +2073,6 @@
           <pc:docMk/>
           <pc:sldMk cId="2229704913" sldId="362"/>
         </pc:sldMkLst>
-        <pc:spChg chg="del">
-          <ac:chgData name="Weifeng Xu" userId="e7aed605-a3dd-4d5a-a692-a87037af107b" providerId="ADAL" clId="{F99F8FFF-BA20-43EA-924B-4DF5D2A785F3}" dt="2025-09-09T13:48:07.245" v="280" actId="700"/>
-          <ac:spMkLst>
-            <pc:docMk/>
-            <pc:sldMk cId="2229704913" sldId="362"/>
-            <ac:spMk id="2" creationId="{08F988BB-2C24-6CAF-06F8-15E7862CD40F}"/>
-          </ac:spMkLst>
-        </pc:spChg>
         <pc:spChg chg="add mod">
           <ac:chgData name="Weifeng Xu" userId="e7aed605-a3dd-4d5a-a692-a87037af107b" providerId="ADAL" clId="{F99F8FFF-BA20-43EA-924B-4DF5D2A785F3}" dt="2025-09-09T13:48:20.760" v="287" actId="1076"/>
           <ac:spMkLst>
@@ -2133,27 +2091,11 @@
         </pc:graphicFrameChg>
       </pc:sldChg>
       <pc:sldChg chg="addSp delSp modSp new mod modClrScheme chgLayout">
-        <pc:chgData name="Weifeng Xu" userId="e7aed605-a3dd-4d5a-a692-a87037af107b" providerId="ADAL" clId="{F99F8FFF-BA20-43EA-924B-4DF5D2A785F3}" dt="2025-09-09T14:00:08.236" v="376" actId="207"/>
+        <pc:chgData name="Weifeng Xu" userId="e7aed605-a3dd-4d5a-a692-a87037af107b" providerId="ADAL" clId="{F99F8FFF-BA20-43EA-924B-4DF5D2A785F3}" dt="2025-09-11T15:27:36.244" v="407" actId="6549"/>
         <pc:sldMkLst>
           <pc:docMk/>
           <pc:sldMk cId="4121565291" sldId="363"/>
         </pc:sldMkLst>
-        <pc:spChg chg="del">
-          <ac:chgData name="Weifeng Xu" userId="e7aed605-a3dd-4d5a-a692-a87037af107b" providerId="ADAL" clId="{F99F8FFF-BA20-43EA-924B-4DF5D2A785F3}" dt="2025-09-09T13:56:17.207" v="289" actId="700"/>
-          <ac:spMkLst>
-            <pc:docMk/>
-            <pc:sldMk cId="4121565291" sldId="363"/>
-            <ac:spMk id="2" creationId="{9C89C4D5-0261-42E7-4045-CABB2E80E09D}"/>
-          </ac:spMkLst>
-        </pc:spChg>
-        <pc:spChg chg="del">
-          <ac:chgData name="Weifeng Xu" userId="e7aed605-a3dd-4d5a-a692-a87037af107b" providerId="ADAL" clId="{F99F8FFF-BA20-43EA-924B-4DF5D2A785F3}" dt="2025-09-09T13:56:17.207" v="289" actId="700"/>
-          <ac:spMkLst>
-            <pc:docMk/>
-            <pc:sldMk cId="4121565291" sldId="363"/>
-            <ac:spMk id="3" creationId="{57B43AC5-B8B1-AFAA-FC4C-7BF8D1259AF0}"/>
-          </ac:spMkLst>
-        </pc:spChg>
         <pc:spChg chg="add mod">
           <ac:chgData name="Weifeng Xu" userId="e7aed605-a3dd-4d5a-a692-a87037af107b" providerId="ADAL" clId="{F99F8FFF-BA20-43EA-924B-4DF5D2A785F3}" dt="2025-09-09T13:56:56.194" v="298" actId="20577"/>
           <ac:spMkLst>
@@ -2163,7 +2105,7 @@
           </ac:spMkLst>
         </pc:spChg>
         <pc:spChg chg="add mod">
-          <ac:chgData name="Weifeng Xu" userId="e7aed605-a3dd-4d5a-a692-a87037af107b" providerId="ADAL" clId="{F99F8FFF-BA20-43EA-924B-4DF5D2A785F3}" dt="2025-09-09T14:00:08.236" v="376" actId="207"/>
+          <ac:chgData name="Weifeng Xu" userId="e7aed605-a3dd-4d5a-a692-a87037af107b" providerId="ADAL" clId="{F99F8FFF-BA20-43EA-924B-4DF5D2A785F3}" dt="2025-09-11T15:27:36.244" v="407" actId="6549"/>
           <ac:spMkLst>
             <pc:docMk/>
             <pc:sldMk cId="4121565291" sldId="363"/>
@@ -4583,7 +4525,7 @@
           <a:p>
             <a:fld id="{EE41F6E3-57F9-402E-BDBA-5B2DE11C8530}" type="datetimeFigureOut">
               <a:rPr lang="en-US" smtClean="0"/>
-              <a:t>9/8/2025</a:t>
+              <a:t>9/11/2025</a:t>
             </a:fld>
             <a:endParaRPr lang="en-US"/>
           </a:p>
@@ -10863,7 +10805,7 @@
           <a:p>
             <a:fld id="{4263717A-E3C1-4BED-ABE0-B7069385E023}" type="datetimeFigureOut">
               <a:rPr lang="en-US" smtClean="0"/>
-              <a:t>9/8/2025</a:t>
+              <a:t>9/11/2025</a:t>
             </a:fld>
             <a:endParaRPr lang="en-US"/>
           </a:p>
@@ -11036,7 +10978,7 @@
           <a:p>
             <a:fld id="{4263717A-E3C1-4BED-ABE0-B7069385E023}" type="datetimeFigureOut">
               <a:rPr lang="en-US" smtClean="0"/>
-              <a:t>9/8/2025</a:t>
+              <a:t>9/11/2025</a:t>
             </a:fld>
             <a:endParaRPr lang="en-US"/>
           </a:p>
@@ -11214,7 +11156,7 @@
           <a:p>
             <a:fld id="{4263717A-E3C1-4BED-ABE0-B7069385E023}" type="datetimeFigureOut">
               <a:rPr lang="en-US" smtClean="0"/>
-              <a:t>9/8/2025</a:t>
+              <a:t>9/11/2025</a:t>
             </a:fld>
             <a:endParaRPr lang="en-US"/>
           </a:p>
@@ -11382,7 +11324,7 @@
           <a:p>
             <a:fld id="{4263717A-E3C1-4BED-ABE0-B7069385E023}" type="datetimeFigureOut">
               <a:rPr lang="en-US" smtClean="0"/>
-              <a:t>9/8/2025</a:t>
+              <a:t>9/11/2025</a:t>
             </a:fld>
             <a:endParaRPr lang="en-US"/>
           </a:p>
@@ -11627,7 +11569,7 @@
           <a:p>
             <a:fld id="{4263717A-E3C1-4BED-ABE0-B7069385E023}" type="datetimeFigureOut">
               <a:rPr lang="en-US" smtClean="0"/>
-              <a:t>9/8/2025</a:t>
+              <a:t>9/11/2025</a:t>
             </a:fld>
             <a:endParaRPr lang="en-US"/>
           </a:p>
@@ -11856,7 +11798,7 @@
           <a:p>
             <a:fld id="{4263717A-E3C1-4BED-ABE0-B7069385E023}" type="datetimeFigureOut">
               <a:rPr lang="en-US" smtClean="0"/>
-              <a:t>9/8/2025</a:t>
+              <a:t>9/11/2025</a:t>
             </a:fld>
             <a:endParaRPr lang="en-US"/>
           </a:p>
@@ -12220,7 +12162,7 @@
           <a:p>
             <a:fld id="{4263717A-E3C1-4BED-ABE0-B7069385E023}" type="datetimeFigureOut">
               <a:rPr lang="en-US" smtClean="0"/>
-              <a:t>9/8/2025</a:t>
+              <a:t>9/11/2025</a:t>
             </a:fld>
             <a:endParaRPr lang="en-US"/>
           </a:p>
@@ -12337,7 +12279,7 @@
           <a:p>
             <a:fld id="{4263717A-E3C1-4BED-ABE0-B7069385E023}" type="datetimeFigureOut">
               <a:rPr lang="en-US" smtClean="0"/>
-              <a:t>9/8/2025</a:t>
+              <a:t>9/11/2025</a:t>
             </a:fld>
             <a:endParaRPr lang="en-US"/>
           </a:p>
@@ -12432,7 +12374,7 @@
           <a:p>
             <a:fld id="{4263717A-E3C1-4BED-ABE0-B7069385E023}" type="datetimeFigureOut">
               <a:rPr lang="en-US" smtClean="0"/>
-              <a:t>9/8/2025</a:t>
+              <a:t>9/11/2025</a:t>
             </a:fld>
             <a:endParaRPr lang="en-US"/>
           </a:p>
@@ -12707,7 +12649,7 @@
           <a:p>
             <a:fld id="{4263717A-E3C1-4BED-ABE0-B7069385E023}" type="datetimeFigureOut">
               <a:rPr lang="en-US" smtClean="0"/>
-              <a:t>9/8/2025</a:t>
+              <a:t>9/11/2025</a:t>
             </a:fld>
             <a:endParaRPr lang="en-US"/>
           </a:p>
@@ -12959,7 +12901,7 @@
           <a:p>
             <a:fld id="{4263717A-E3C1-4BED-ABE0-B7069385E023}" type="datetimeFigureOut">
               <a:rPr lang="en-US" smtClean="0"/>
-              <a:t>9/8/2025</a:t>
+              <a:t>9/11/2025</a:t>
             </a:fld>
             <a:endParaRPr lang="en-US"/>
           </a:p>
@@ -13170,7 +13112,7 @@
           <a:p>
             <a:fld id="{4263717A-E3C1-4BED-ABE0-B7069385E023}" type="datetimeFigureOut">
               <a:rPr lang="en-US" smtClean="0"/>
-              <a:t>9/8/2025</a:t>
+              <a:t>9/11/2025</a:t>
             </a:fld>
             <a:endParaRPr lang="en-US"/>
           </a:p>
@@ -16430,7 +16372,7 @@
                         <a:buNone/>
                       </a:pPr>
                       <a:r>
-                        <a:rPr lang="en-US" sz="1400"/>
+                        <a:rPr lang="en-US" sz="1400" dirty="0"/>
                         <a:t>Builds installation timelines, identifies suspicious apps.</a:t>
                       </a:r>
                     </a:p>
@@ -19793,7 +19735,7 @@
           <a:p>
             <a:r>
               <a:rPr lang="en-US" dirty="0"/>
-              <a:t> Special format (</a:t>
+              <a:t>Special format (</a:t>
             </a:r>
             <a:r>
               <a:rPr lang="en-US" dirty="0">
@@ -19850,95 +19792,6 @@
       </p:grpSpPr>
       <p:sp>
         <p:nvSpPr>
-          <p:cNvPr id="5" name="Rectangle 2">
-            <a:extLst>
-              <a:ext uri="{FF2B5EF4-FFF2-40B4-BE49-F238E27FC236}">
-                <a16:creationId xmlns:a16="http://schemas.microsoft.com/office/drawing/2014/main" id="{238B2818-0C2A-4945-8FA7-025F23B99D45}"/>
-              </a:ext>
-            </a:extLst>
-          </p:cNvPr>
-          <p:cNvSpPr>
-            <a:spLocks noChangeArrowheads="1"/>
-          </p:cNvSpPr>
-          <p:nvPr/>
-        </p:nvSpPr>
-        <p:spPr bwMode="auto">
-          <a:xfrm>
-            <a:off x="0" y="-138499"/>
-            <a:ext cx="65" cy="276999"/>
-          </a:xfrm>
-          <a:prstGeom prst="rect">
-            <a:avLst/>
-          </a:prstGeom>
-          <a:solidFill>
-            <a:srgbClr val="FFFFFF"/>
-          </a:solidFill>
-          <a:ln>
-            <a:noFill/>
-          </a:ln>
-          <a:effectLst/>
-          <a:extLst>
-            <a:ext uri="{91240B29-F687-4F45-9708-019B960494DF}">
-              <a14:hiddenLine xmlns:a14="http://schemas.microsoft.com/office/drawing/2010/main" w="9525">
-                <a:solidFill>
-                  <a:schemeClr val="tx1"/>
-                </a:solidFill>
-                <a:miter lim="800000"/>
-                <a:headEnd/>
-                <a:tailEnd/>
-              </a14:hiddenLine>
-            </a:ext>
-            <a:ext uri="{AF507438-7753-43E0-B8FC-AC1667EBCBE1}">
-              <a14:hiddenEffects xmlns:a14="http://schemas.microsoft.com/office/drawing/2010/main">
-                <a:effectLst>
-                  <a:outerShdw dist="35921" dir="2700000" algn="ctr" rotWithShape="0">
-                    <a:schemeClr val="bg2"/>
-                  </a:outerShdw>
-                </a:effectLst>
-              </a14:hiddenEffects>
-            </a:ext>
-          </a:extLst>
-        </p:spPr>
-        <p:txBody>
-          <a:bodyPr vert="horz" wrap="none" lIns="0" tIns="0" rIns="0" bIns="0" numCol="1" anchor="ctr" anchorCtr="0" compatLnSpc="1">
-            <a:prstTxWarp prst="textNoShape">
-              <a:avLst/>
-            </a:prstTxWarp>
-            <a:spAutoFit/>
-          </a:bodyPr>
-          <a:lstStyle/>
-          <a:p>
-            <a:pPr marL="0" marR="0" lvl="0" indent="0" algn="l" defTabSz="914400" rtl="0" eaLnBrk="0" fontAlgn="base" latinLnBrk="0" hangingPunct="0">
-              <a:lnSpc>
-                <a:spcPct val="100000"/>
-              </a:lnSpc>
-              <a:spcBef>
-                <a:spcPct val="0"/>
-              </a:spcBef>
-              <a:spcAft>
-                <a:spcPct val="0"/>
-              </a:spcAft>
-              <a:buClrTx/>
-              <a:buSzTx/>
-              <a:buFontTx/>
-              <a:buNone/>
-              <a:tabLst/>
-            </a:pPr>
-            <a:endParaRPr kumimoji="0" lang="en-US" altLang="en-US" sz="1800" b="0" i="0" u="none" strike="noStrike" cap="none" normalizeH="0" baseline="0">
-              <a:ln>
-                <a:noFill/>
-              </a:ln>
-              <a:solidFill>
-                <a:schemeClr val="tx1"/>
-              </a:solidFill>
-              <a:effectLst/>
-              <a:latin typeface="Arial" panose="020B0604020202020204" pitchFamily="34" charset="0"/>
-            </a:endParaRPr>
-          </a:p>
-        </p:txBody>
-      </p:sp>
-      <p:sp>
-        <p:nvSpPr>
           <p:cNvPr id="7" name="TextBox 6">
             <a:extLst>
               <a:ext uri="{FF2B5EF4-FFF2-40B4-BE49-F238E27FC236}">
@@ -20039,7 +19892,7 @@
                 <a:ea typeface="inherit"/>
                 <a:cs typeface="Arial" panose="020B0604020202020204" pitchFamily="34" charset="0"/>
               </a:rPr>
-              <a:t> service which controls application permissions;</a:t>
+              <a:t> service, which controls application permissions;</a:t>
             </a:r>
           </a:p>
           <a:p>
@@ -20195,7 +20048,7 @@
                 <a:ea typeface="inherit"/>
                 <a:cs typeface="Arial" panose="020B0604020202020204" pitchFamily="34" charset="0"/>
               </a:rPr>
-              <a:t> service to keeps power statistics of application installed;</a:t>
+              <a:t> service to keep power statistics of applications installed;</a:t>
             </a:r>
           </a:p>
           <a:p>
@@ -20336,37 +20189,7 @@
                 <a:ea typeface="inherit"/>
                 <a:cs typeface="Arial" panose="020B0604020202020204" pitchFamily="34" charset="0"/>
               </a:rPr>
-              <a:t> with IME locales, keyboard layout sets </a:t>
-            </a:r>
-            <a:r>
-              <a:rPr kumimoji="0" lang="en-US" altLang="en-US" sz="2400" b="0" i="0" u="none" strike="noStrike" cap="none" normalizeH="0" baseline="0" dirty="0" err="1">
-                <a:ln>
-                  <a:noFill/>
-                </a:ln>
-                <a:solidFill>
-                  <a:srgbClr val="242729"/>
-                </a:solidFill>
-                <a:effectLst/>
-                <a:latin typeface="Arial" panose="020B0604020202020204" pitchFamily="34" charset="0"/>
-                <a:ea typeface="inherit"/>
-                <a:cs typeface="Arial" panose="020B0604020202020204" pitchFamily="34" charset="0"/>
-              </a:rPr>
-              <a:t>etc</a:t>
-            </a:r>
-            <a:r>
-              <a:rPr kumimoji="0" lang="en-US" altLang="en-US" sz="2400" b="0" i="0" u="none" strike="noStrike" cap="none" normalizeH="0" baseline="0" dirty="0">
-                <a:ln>
-                  <a:noFill/>
-                </a:ln>
-                <a:solidFill>
-                  <a:srgbClr val="242729"/>
-                </a:solidFill>
-                <a:effectLst/>
-                <a:latin typeface="Arial" panose="020B0604020202020204" pitchFamily="34" charset="0"/>
-                <a:ea typeface="inherit"/>
-                <a:cs typeface="Arial" panose="020B0604020202020204" pitchFamily="34" charset="0"/>
-              </a:rPr>
-              <a:t>;</a:t>
+              <a:t> with IME locales, keyboard layout sets, etc.</a:t>
             </a:r>
           </a:p>
           <a:p>
@@ -20414,7 +20237,7 @@
                 <a:ea typeface="inherit"/>
                 <a:cs typeface="Arial" panose="020B0604020202020204" pitchFamily="34" charset="0"/>
               </a:rPr>
-              <a:t> - a </a:t>
+              <a:t> - an </a:t>
             </a:r>
             <a:r>
               <a:rPr kumimoji="0" lang="en-US" altLang="en-US" sz="2400" b="0" i="0" u="none" strike="noStrike" cap="none" normalizeH="0" baseline="0" dirty="0">
@@ -20613,41 +20436,6 @@
               <a:latin typeface="Arial" panose="020B0604020202020204" pitchFamily="34" charset="0"/>
               <a:cs typeface="Arial" panose="020B0604020202020204" pitchFamily="34" charset="0"/>
             </a:endParaRPr>
-          </a:p>
-        </p:txBody>
-      </p:sp>
-      <p:sp>
-        <p:nvSpPr>
-          <p:cNvPr id="9" name="TextBox 8">
-            <a:extLst>
-              <a:ext uri="{FF2B5EF4-FFF2-40B4-BE49-F238E27FC236}">
-                <a16:creationId xmlns:a16="http://schemas.microsoft.com/office/drawing/2014/main" id="{0FAC32FE-7A05-44A4-BE9F-03BCE7E7029A}"/>
-              </a:ext>
-            </a:extLst>
-          </p:cNvPr>
-          <p:cNvSpPr txBox="1"/>
-          <p:nvPr/>
-        </p:nvSpPr>
-        <p:spPr>
-          <a:xfrm>
-            <a:off x="7714526" y="6447098"/>
-            <a:ext cx="2980482" cy="646331"/>
-          </a:xfrm>
-          <a:prstGeom prst="rect">
-            <a:avLst/>
-          </a:prstGeom>
-          <a:noFill/>
-        </p:spPr>
-        <p:txBody>
-          <a:bodyPr wrap="square">
-            <a:spAutoFit/>
-          </a:bodyPr>
-          <a:lstStyle/>
-          <a:p>
-            <a:r>
-              <a:rPr lang="en-US"/>
-              <a:t>P48. http://newandroidbook.com/</a:t>
-            </a:r>
           </a:p>
         </p:txBody>
       </p:sp>
@@ -28272,33 +28060,28 @@
             <a:pPr lvl="1"/>
             <a:r>
               <a:rPr lang="en-US" dirty="0"/>
-              <a:t>including Linux commands Python code</a:t>
+              <a:t>including Linux commands and Python code</a:t>
             </a:r>
           </a:p>
           <a:p>
             <a:r>
               <a:rPr lang="en-US" dirty="0"/>
-              <a:t>Pay special attention to slides 25-31 because the Google </a:t>
-            </a:r>
-            <a:r>
-              <a:rPr lang="en-US" dirty="0" err="1"/>
-              <a:t>Playstore</a:t>
+              <a:t>Pay special attention to slide </a:t>
+            </a:r>
+            <a:r>
+              <a:rPr lang="en-US" altLang="zh-CN" dirty="0"/>
+              <a:t>34</a:t>
             </a:r>
             <a:r>
               <a:rPr lang="en-US" dirty="0"/>
-              <a:t> encodes app names differently in HTML pages</a:t>
+              <a:t> because the Google Play Store encodes app names differently in HTML pages</a:t>
             </a:r>
           </a:p>
           <a:p>
             <a:r>
               <a:rPr lang="en-US" dirty="0"/>
-              <a:t>Need to show Python </a:t>
-            </a:r>
-            <a:r>
-              <a:rPr lang="en-US"/>
-              <a:t>execution results</a:t>
-            </a:r>
-            <a:endParaRPr lang="en-US" dirty="0"/>
+              <a:t>Need to show Python execution results</a:t>
+            </a:r>
           </a:p>
           <a:p>
             <a:endParaRPr lang="en-US" dirty="0"/>

</xml_diff>